<commit_message>
Fixed the BPSK System diagram: added Sampler
</commit_message>
<xml_diff>
--- a/doc/tex/sdf/bpsk_system/figures_raw/diagramNEW_BW.pptx
+++ b/doc/tex/sdf/bpsk_system/figures_raw/diagramNEW_BW.pptx
@@ -112,6 +112,10 @@
 </p:presentation>
 </file>
 
+<file path=ppt/revisionInfo.xml><?xml version="1.0" encoding="utf-8"?>
+<p1510:revInfo xmlns:a="http://schemas.openxmlformats.org/drawingml/2006/main" xmlns:r="http://schemas.openxmlformats.org/officeDocument/2006/relationships" xmlns:p1510="http://schemas.microsoft.com/office/powerpoint/2015/10/main"/>
+</file>
+
 <file path=ppt/slideLayouts/slideLayout1.xml><?xml version="1.0" encoding="utf-8"?>
 <p:sldLayout xmlns:a="http://schemas.openxmlformats.org/drawingml/2006/main" xmlns:r="http://schemas.openxmlformats.org/officeDocument/2006/relationships" xmlns:p="http://schemas.openxmlformats.org/presentationml/2006/main" type="title" preserve="1">
   <p:cSld name="Title Slide">
@@ -154,7 +158,7 @@
           </a:lstStyle>
           <a:p>
             <a:r>
-              <a:rPr lang="en-US" smtClean="0"/>
+              <a:rPr lang="en-US"/>
               <a:t>Click to edit Master title style</a:t>
             </a:r>
             <a:endParaRPr lang="en-US" dirty="0"/>
@@ -219,7 +223,7 @@
           </a:lstStyle>
           <a:p>
             <a:r>
-              <a:rPr lang="en-US" smtClean="0"/>
+              <a:rPr lang="en-US"/>
               <a:t>Click to edit Master subtitle style</a:t>
             </a:r>
             <a:endParaRPr lang="en-US" dirty="0"/>
@@ -243,7 +247,7 @@
           <a:p>
             <a:fld id="{20E2EE0F-699F-4CB1-B62B-38A965547372}" type="datetimeFigureOut">
               <a:rPr lang="pt-PT" smtClean="0"/>
-              <a:t>06/11/2017</a:t>
+              <a:t>02/02/2018</a:t>
             </a:fld>
             <a:endParaRPr lang="pt-PT"/>
           </a:p>
@@ -285,7 +289,7 @@
           <a:p>
             <a:fld id="{A4B850BD-FB52-4BDF-92B9-E9A29B33DEBB}" type="slidenum">
               <a:rPr lang="pt-PT" smtClean="0"/>
-              <a:t>‹#›</a:t>
+              <a:t>‹nº›</a:t>
             </a:fld>
             <a:endParaRPr lang="pt-PT"/>
           </a:p>
@@ -337,7 +341,7 @@
           <a:lstStyle/>
           <a:p>
             <a:r>
-              <a:rPr lang="en-US" smtClean="0"/>
+              <a:rPr lang="en-US"/>
               <a:t>Click to edit Master title style</a:t>
             </a:r>
             <a:endParaRPr lang="en-US" dirty="0"/>
@@ -361,35 +365,35 @@
           <a:p>
             <a:pPr lvl="0"/>
             <a:r>
-              <a:rPr lang="en-US" smtClean="0"/>
+              <a:rPr lang="en-US"/>
               <a:t>Edit Master text styles</a:t>
             </a:r>
           </a:p>
           <a:p>
             <a:pPr lvl="1"/>
             <a:r>
-              <a:rPr lang="en-US" smtClean="0"/>
+              <a:rPr lang="en-US"/>
               <a:t>Second level</a:t>
             </a:r>
           </a:p>
           <a:p>
             <a:pPr lvl="2"/>
             <a:r>
-              <a:rPr lang="en-US" smtClean="0"/>
+              <a:rPr lang="en-US"/>
               <a:t>Third level</a:t>
             </a:r>
           </a:p>
           <a:p>
             <a:pPr lvl="3"/>
             <a:r>
-              <a:rPr lang="en-US" smtClean="0"/>
+              <a:rPr lang="en-US"/>
               <a:t>Fourth level</a:t>
             </a:r>
           </a:p>
           <a:p>
             <a:pPr lvl="4"/>
             <a:r>
-              <a:rPr lang="en-US" smtClean="0"/>
+              <a:rPr lang="en-US"/>
               <a:t>Fifth level</a:t>
             </a:r>
             <a:endParaRPr lang="en-US" dirty="0"/>
@@ -413,7 +417,7 @@
           <a:p>
             <a:fld id="{20E2EE0F-699F-4CB1-B62B-38A965547372}" type="datetimeFigureOut">
               <a:rPr lang="pt-PT" smtClean="0"/>
-              <a:t>06/11/2017</a:t>
+              <a:t>02/02/2018</a:t>
             </a:fld>
             <a:endParaRPr lang="pt-PT"/>
           </a:p>
@@ -455,7 +459,7 @@
           <a:p>
             <a:fld id="{A4B850BD-FB52-4BDF-92B9-E9A29B33DEBB}" type="slidenum">
               <a:rPr lang="pt-PT" smtClean="0"/>
-              <a:t>‹#›</a:t>
+              <a:t>‹nº›</a:t>
             </a:fld>
             <a:endParaRPr lang="pt-PT"/>
           </a:p>
@@ -512,7 +516,7 @@
           <a:lstStyle/>
           <a:p>
             <a:r>
-              <a:rPr lang="en-US" smtClean="0"/>
+              <a:rPr lang="en-US"/>
               <a:t>Click to edit Master title style</a:t>
             </a:r>
             <a:endParaRPr lang="en-US" dirty="0"/>
@@ -541,35 +545,35 @@
           <a:p>
             <a:pPr lvl="0"/>
             <a:r>
-              <a:rPr lang="en-US" smtClean="0"/>
+              <a:rPr lang="en-US"/>
               <a:t>Edit Master text styles</a:t>
             </a:r>
           </a:p>
           <a:p>
             <a:pPr lvl="1"/>
             <a:r>
-              <a:rPr lang="en-US" smtClean="0"/>
+              <a:rPr lang="en-US"/>
               <a:t>Second level</a:t>
             </a:r>
           </a:p>
           <a:p>
             <a:pPr lvl="2"/>
             <a:r>
-              <a:rPr lang="en-US" smtClean="0"/>
+              <a:rPr lang="en-US"/>
               <a:t>Third level</a:t>
             </a:r>
           </a:p>
           <a:p>
             <a:pPr lvl="3"/>
             <a:r>
-              <a:rPr lang="en-US" smtClean="0"/>
+              <a:rPr lang="en-US"/>
               <a:t>Fourth level</a:t>
             </a:r>
           </a:p>
           <a:p>
             <a:pPr lvl="4"/>
             <a:r>
-              <a:rPr lang="en-US" smtClean="0"/>
+              <a:rPr lang="en-US"/>
               <a:t>Fifth level</a:t>
             </a:r>
             <a:endParaRPr lang="en-US" dirty="0"/>
@@ -593,7 +597,7 @@
           <a:p>
             <a:fld id="{20E2EE0F-699F-4CB1-B62B-38A965547372}" type="datetimeFigureOut">
               <a:rPr lang="pt-PT" smtClean="0"/>
-              <a:t>06/11/2017</a:t>
+              <a:t>02/02/2018</a:t>
             </a:fld>
             <a:endParaRPr lang="pt-PT"/>
           </a:p>
@@ -635,7 +639,7 @@
           <a:p>
             <a:fld id="{A4B850BD-FB52-4BDF-92B9-E9A29B33DEBB}" type="slidenum">
               <a:rPr lang="pt-PT" smtClean="0"/>
-              <a:t>‹#›</a:t>
+              <a:t>‹nº›</a:t>
             </a:fld>
             <a:endParaRPr lang="pt-PT"/>
           </a:p>
@@ -687,7 +691,7 @@
           <a:lstStyle/>
           <a:p>
             <a:r>
-              <a:rPr lang="en-US" smtClean="0"/>
+              <a:rPr lang="en-US"/>
               <a:t>Click to edit Master title style</a:t>
             </a:r>
             <a:endParaRPr lang="en-US" dirty="0"/>
@@ -711,35 +715,35 @@
           <a:p>
             <a:pPr lvl="0"/>
             <a:r>
-              <a:rPr lang="en-US" smtClean="0"/>
+              <a:rPr lang="en-US"/>
               <a:t>Edit Master text styles</a:t>
             </a:r>
           </a:p>
           <a:p>
             <a:pPr lvl="1"/>
             <a:r>
-              <a:rPr lang="en-US" smtClean="0"/>
+              <a:rPr lang="en-US"/>
               <a:t>Second level</a:t>
             </a:r>
           </a:p>
           <a:p>
             <a:pPr lvl="2"/>
             <a:r>
-              <a:rPr lang="en-US" smtClean="0"/>
+              <a:rPr lang="en-US"/>
               <a:t>Third level</a:t>
             </a:r>
           </a:p>
           <a:p>
             <a:pPr lvl="3"/>
             <a:r>
-              <a:rPr lang="en-US" smtClean="0"/>
+              <a:rPr lang="en-US"/>
               <a:t>Fourth level</a:t>
             </a:r>
           </a:p>
           <a:p>
             <a:pPr lvl="4"/>
             <a:r>
-              <a:rPr lang="en-US" smtClean="0"/>
+              <a:rPr lang="en-US"/>
               <a:t>Fifth level</a:t>
             </a:r>
             <a:endParaRPr lang="en-US" dirty="0"/>
@@ -763,7 +767,7 @@
           <a:p>
             <a:fld id="{20E2EE0F-699F-4CB1-B62B-38A965547372}" type="datetimeFigureOut">
               <a:rPr lang="pt-PT" smtClean="0"/>
-              <a:t>06/11/2017</a:t>
+              <a:t>02/02/2018</a:t>
             </a:fld>
             <a:endParaRPr lang="pt-PT"/>
           </a:p>
@@ -805,7 +809,7 @@
           <a:p>
             <a:fld id="{A4B850BD-FB52-4BDF-92B9-E9A29B33DEBB}" type="slidenum">
               <a:rPr lang="pt-PT" smtClean="0"/>
-              <a:t>‹#›</a:t>
+              <a:t>‹nº›</a:t>
             </a:fld>
             <a:endParaRPr lang="pt-PT"/>
           </a:p>
@@ -866,7 +870,7 @@
           </a:lstStyle>
           <a:p>
             <a:r>
-              <a:rPr lang="en-US" smtClean="0"/>
+              <a:rPr lang="en-US"/>
               <a:t>Click to edit Master title style</a:t>
             </a:r>
             <a:endParaRPr lang="en-US" dirty="0"/>
@@ -986,7 +990,7 @@
           <a:p>
             <a:pPr lvl="0"/>
             <a:r>
-              <a:rPr lang="en-US" smtClean="0"/>
+              <a:rPr lang="en-US"/>
               <a:t>Edit Master text styles</a:t>
             </a:r>
           </a:p>
@@ -1009,7 +1013,7 @@
           <a:p>
             <a:fld id="{20E2EE0F-699F-4CB1-B62B-38A965547372}" type="datetimeFigureOut">
               <a:rPr lang="pt-PT" smtClean="0"/>
-              <a:t>06/11/2017</a:t>
+              <a:t>02/02/2018</a:t>
             </a:fld>
             <a:endParaRPr lang="pt-PT"/>
           </a:p>
@@ -1051,7 +1055,7 @@
           <a:p>
             <a:fld id="{A4B850BD-FB52-4BDF-92B9-E9A29B33DEBB}" type="slidenum">
               <a:rPr lang="pt-PT" smtClean="0"/>
-              <a:t>‹#›</a:t>
+              <a:t>‹nº›</a:t>
             </a:fld>
             <a:endParaRPr lang="pt-PT"/>
           </a:p>
@@ -1103,7 +1107,7 @@
           <a:lstStyle/>
           <a:p>
             <a:r>
-              <a:rPr lang="en-US" smtClean="0"/>
+              <a:rPr lang="en-US"/>
               <a:t>Click to edit Master title style</a:t>
             </a:r>
             <a:endParaRPr lang="en-US" dirty="0"/>
@@ -1132,35 +1136,35 @@
           <a:p>
             <a:pPr lvl="0"/>
             <a:r>
-              <a:rPr lang="en-US" smtClean="0"/>
+              <a:rPr lang="en-US"/>
               <a:t>Edit Master text styles</a:t>
             </a:r>
           </a:p>
           <a:p>
             <a:pPr lvl="1"/>
             <a:r>
-              <a:rPr lang="en-US" smtClean="0"/>
+              <a:rPr lang="en-US"/>
               <a:t>Second level</a:t>
             </a:r>
           </a:p>
           <a:p>
             <a:pPr lvl="2"/>
             <a:r>
-              <a:rPr lang="en-US" smtClean="0"/>
+              <a:rPr lang="en-US"/>
               <a:t>Third level</a:t>
             </a:r>
           </a:p>
           <a:p>
             <a:pPr lvl="3"/>
             <a:r>
-              <a:rPr lang="en-US" smtClean="0"/>
+              <a:rPr lang="en-US"/>
               <a:t>Fourth level</a:t>
             </a:r>
           </a:p>
           <a:p>
             <a:pPr lvl="4"/>
             <a:r>
-              <a:rPr lang="en-US" smtClean="0"/>
+              <a:rPr lang="en-US"/>
               <a:t>Fifth level</a:t>
             </a:r>
             <a:endParaRPr lang="en-US" dirty="0"/>
@@ -1189,35 +1193,35 @@
           <a:p>
             <a:pPr lvl="0"/>
             <a:r>
-              <a:rPr lang="en-US" smtClean="0"/>
+              <a:rPr lang="en-US"/>
               <a:t>Edit Master text styles</a:t>
             </a:r>
           </a:p>
           <a:p>
             <a:pPr lvl="1"/>
             <a:r>
-              <a:rPr lang="en-US" smtClean="0"/>
+              <a:rPr lang="en-US"/>
               <a:t>Second level</a:t>
             </a:r>
           </a:p>
           <a:p>
             <a:pPr lvl="2"/>
             <a:r>
-              <a:rPr lang="en-US" smtClean="0"/>
+              <a:rPr lang="en-US"/>
               <a:t>Third level</a:t>
             </a:r>
           </a:p>
           <a:p>
             <a:pPr lvl="3"/>
             <a:r>
-              <a:rPr lang="en-US" smtClean="0"/>
+              <a:rPr lang="en-US"/>
               <a:t>Fourth level</a:t>
             </a:r>
           </a:p>
           <a:p>
             <a:pPr lvl="4"/>
             <a:r>
-              <a:rPr lang="en-US" smtClean="0"/>
+              <a:rPr lang="en-US"/>
               <a:t>Fifth level</a:t>
             </a:r>
             <a:endParaRPr lang="en-US" dirty="0"/>
@@ -1241,7 +1245,7 @@
           <a:p>
             <a:fld id="{20E2EE0F-699F-4CB1-B62B-38A965547372}" type="datetimeFigureOut">
               <a:rPr lang="pt-PT" smtClean="0"/>
-              <a:t>06/11/2017</a:t>
+              <a:t>02/02/2018</a:t>
             </a:fld>
             <a:endParaRPr lang="pt-PT"/>
           </a:p>
@@ -1283,7 +1287,7 @@
           <a:p>
             <a:fld id="{A4B850BD-FB52-4BDF-92B9-E9A29B33DEBB}" type="slidenum">
               <a:rPr lang="pt-PT" smtClean="0"/>
-              <a:t>‹#›</a:t>
+              <a:t>‹nº›</a:t>
             </a:fld>
             <a:endParaRPr lang="pt-PT"/>
           </a:p>
@@ -1340,7 +1344,7 @@
           <a:lstStyle/>
           <a:p>
             <a:r>
-              <a:rPr lang="en-US" smtClean="0"/>
+              <a:rPr lang="en-US"/>
               <a:t>Click to edit Master title style</a:t>
             </a:r>
             <a:endParaRPr lang="en-US" dirty="0"/>
@@ -1406,7 +1410,7 @@
           <a:p>
             <a:pPr lvl="0"/>
             <a:r>
-              <a:rPr lang="en-US" smtClean="0"/>
+              <a:rPr lang="en-US"/>
               <a:t>Edit Master text styles</a:t>
             </a:r>
           </a:p>
@@ -1434,35 +1438,35 @@
           <a:p>
             <a:pPr lvl="0"/>
             <a:r>
-              <a:rPr lang="en-US" smtClean="0"/>
+              <a:rPr lang="en-US"/>
               <a:t>Edit Master text styles</a:t>
             </a:r>
           </a:p>
           <a:p>
             <a:pPr lvl="1"/>
             <a:r>
-              <a:rPr lang="en-US" smtClean="0"/>
+              <a:rPr lang="en-US"/>
               <a:t>Second level</a:t>
             </a:r>
           </a:p>
           <a:p>
             <a:pPr lvl="2"/>
             <a:r>
-              <a:rPr lang="en-US" smtClean="0"/>
+              <a:rPr lang="en-US"/>
               <a:t>Third level</a:t>
             </a:r>
           </a:p>
           <a:p>
             <a:pPr lvl="3"/>
             <a:r>
-              <a:rPr lang="en-US" smtClean="0"/>
+              <a:rPr lang="en-US"/>
               <a:t>Fourth level</a:t>
             </a:r>
           </a:p>
           <a:p>
             <a:pPr lvl="4"/>
             <a:r>
-              <a:rPr lang="en-US" smtClean="0"/>
+              <a:rPr lang="en-US"/>
               <a:t>Fifth level</a:t>
             </a:r>
             <a:endParaRPr lang="en-US" dirty="0"/>
@@ -1528,7 +1532,7 @@
           <a:p>
             <a:pPr lvl="0"/>
             <a:r>
-              <a:rPr lang="en-US" smtClean="0"/>
+              <a:rPr lang="en-US"/>
               <a:t>Edit Master text styles</a:t>
             </a:r>
           </a:p>
@@ -1556,35 +1560,35 @@
           <a:p>
             <a:pPr lvl="0"/>
             <a:r>
-              <a:rPr lang="en-US" smtClean="0"/>
+              <a:rPr lang="en-US"/>
               <a:t>Edit Master text styles</a:t>
             </a:r>
           </a:p>
           <a:p>
             <a:pPr lvl="1"/>
             <a:r>
-              <a:rPr lang="en-US" smtClean="0"/>
+              <a:rPr lang="en-US"/>
               <a:t>Second level</a:t>
             </a:r>
           </a:p>
           <a:p>
             <a:pPr lvl="2"/>
             <a:r>
-              <a:rPr lang="en-US" smtClean="0"/>
+              <a:rPr lang="en-US"/>
               <a:t>Third level</a:t>
             </a:r>
           </a:p>
           <a:p>
             <a:pPr lvl="3"/>
             <a:r>
-              <a:rPr lang="en-US" smtClean="0"/>
+              <a:rPr lang="en-US"/>
               <a:t>Fourth level</a:t>
             </a:r>
           </a:p>
           <a:p>
             <a:pPr lvl="4"/>
             <a:r>
-              <a:rPr lang="en-US" smtClean="0"/>
+              <a:rPr lang="en-US"/>
               <a:t>Fifth level</a:t>
             </a:r>
             <a:endParaRPr lang="en-US" dirty="0"/>
@@ -1608,7 +1612,7 @@
           <a:p>
             <a:fld id="{20E2EE0F-699F-4CB1-B62B-38A965547372}" type="datetimeFigureOut">
               <a:rPr lang="pt-PT" smtClean="0"/>
-              <a:t>06/11/2017</a:t>
+              <a:t>02/02/2018</a:t>
             </a:fld>
             <a:endParaRPr lang="pt-PT"/>
           </a:p>
@@ -1650,7 +1654,7 @@
           <a:p>
             <a:fld id="{A4B850BD-FB52-4BDF-92B9-E9A29B33DEBB}" type="slidenum">
               <a:rPr lang="pt-PT" smtClean="0"/>
-              <a:t>‹#›</a:t>
+              <a:t>‹nº›</a:t>
             </a:fld>
             <a:endParaRPr lang="pt-PT"/>
           </a:p>
@@ -1702,7 +1706,7 @@
           <a:lstStyle/>
           <a:p>
             <a:r>
-              <a:rPr lang="en-US" smtClean="0"/>
+              <a:rPr lang="en-US"/>
               <a:t>Click to edit Master title style</a:t>
             </a:r>
             <a:endParaRPr lang="en-US" dirty="0"/>
@@ -1726,7 +1730,7 @@
           <a:p>
             <a:fld id="{20E2EE0F-699F-4CB1-B62B-38A965547372}" type="datetimeFigureOut">
               <a:rPr lang="pt-PT" smtClean="0"/>
-              <a:t>06/11/2017</a:t>
+              <a:t>02/02/2018</a:t>
             </a:fld>
             <a:endParaRPr lang="pt-PT"/>
           </a:p>
@@ -1768,7 +1772,7 @@
           <a:p>
             <a:fld id="{A4B850BD-FB52-4BDF-92B9-E9A29B33DEBB}" type="slidenum">
               <a:rPr lang="pt-PT" smtClean="0"/>
-              <a:t>‹#›</a:t>
+              <a:t>‹nº›</a:t>
             </a:fld>
             <a:endParaRPr lang="pt-PT"/>
           </a:p>
@@ -1821,7 +1825,7 @@
           <a:p>
             <a:fld id="{20E2EE0F-699F-4CB1-B62B-38A965547372}" type="datetimeFigureOut">
               <a:rPr lang="pt-PT" smtClean="0"/>
-              <a:t>06/11/2017</a:t>
+              <a:t>02/02/2018</a:t>
             </a:fld>
             <a:endParaRPr lang="pt-PT"/>
           </a:p>
@@ -1863,7 +1867,7 @@
           <a:p>
             <a:fld id="{A4B850BD-FB52-4BDF-92B9-E9A29B33DEBB}" type="slidenum">
               <a:rPr lang="pt-PT" smtClean="0"/>
-              <a:t>‹#›</a:t>
+              <a:t>‹nº›</a:t>
             </a:fld>
             <a:endParaRPr lang="pt-PT"/>
           </a:p>
@@ -1924,7 +1928,7 @@
           </a:lstStyle>
           <a:p>
             <a:r>
-              <a:rPr lang="en-US" smtClean="0"/>
+              <a:rPr lang="en-US"/>
               <a:t>Click to edit Master title style</a:t>
             </a:r>
             <a:endParaRPr lang="en-US" dirty="0"/>
@@ -1981,35 +1985,35 @@
           <a:p>
             <a:pPr lvl="0"/>
             <a:r>
-              <a:rPr lang="en-US" smtClean="0"/>
+              <a:rPr lang="en-US"/>
               <a:t>Edit Master text styles</a:t>
             </a:r>
           </a:p>
           <a:p>
             <a:pPr lvl="1"/>
             <a:r>
-              <a:rPr lang="en-US" smtClean="0"/>
+              <a:rPr lang="en-US"/>
               <a:t>Second level</a:t>
             </a:r>
           </a:p>
           <a:p>
             <a:pPr lvl="2"/>
             <a:r>
-              <a:rPr lang="en-US" smtClean="0"/>
+              <a:rPr lang="en-US"/>
               <a:t>Third level</a:t>
             </a:r>
           </a:p>
           <a:p>
             <a:pPr lvl="3"/>
             <a:r>
-              <a:rPr lang="en-US" smtClean="0"/>
+              <a:rPr lang="en-US"/>
               <a:t>Fourth level</a:t>
             </a:r>
           </a:p>
           <a:p>
             <a:pPr lvl="4"/>
             <a:r>
-              <a:rPr lang="en-US" smtClean="0"/>
+              <a:rPr lang="en-US"/>
               <a:t>Fifth level</a:t>
             </a:r>
             <a:endParaRPr lang="en-US" dirty="0"/>
@@ -2075,7 +2079,7 @@
           <a:p>
             <a:pPr lvl="0"/>
             <a:r>
-              <a:rPr lang="en-US" smtClean="0"/>
+              <a:rPr lang="en-US"/>
               <a:t>Edit Master text styles</a:t>
             </a:r>
           </a:p>
@@ -2098,7 +2102,7 @@
           <a:p>
             <a:fld id="{20E2EE0F-699F-4CB1-B62B-38A965547372}" type="datetimeFigureOut">
               <a:rPr lang="pt-PT" smtClean="0"/>
-              <a:t>06/11/2017</a:t>
+              <a:t>02/02/2018</a:t>
             </a:fld>
             <a:endParaRPr lang="pt-PT"/>
           </a:p>
@@ -2140,7 +2144,7 @@
           <a:p>
             <a:fld id="{A4B850BD-FB52-4BDF-92B9-E9A29B33DEBB}" type="slidenum">
               <a:rPr lang="pt-PT" smtClean="0"/>
-              <a:t>‹#›</a:t>
+              <a:t>‹nº›</a:t>
             </a:fld>
             <a:endParaRPr lang="pt-PT"/>
           </a:p>
@@ -2201,7 +2205,7 @@
           </a:lstStyle>
           <a:p>
             <a:r>
-              <a:rPr lang="en-US" smtClean="0"/>
+              <a:rPr lang="en-US"/>
               <a:t>Click to edit Master title style</a:t>
             </a:r>
             <a:endParaRPr lang="en-US" dirty="0"/>
@@ -2266,7 +2270,7 @@
           </a:lstStyle>
           <a:p>
             <a:r>
-              <a:rPr lang="en-US" smtClean="0"/>
+              <a:rPr lang="en-US"/>
               <a:t>Click icon to add picture</a:t>
             </a:r>
             <a:endParaRPr lang="en-US" dirty="0"/>
@@ -2332,7 +2336,7 @@
           <a:p>
             <a:pPr lvl="0"/>
             <a:r>
-              <a:rPr lang="en-US" smtClean="0"/>
+              <a:rPr lang="en-US"/>
               <a:t>Edit Master text styles</a:t>
             </a:r>
           </a:p>
@@ -2355,7 +2359,7 @@
           <a:p>
             <a:fld id="{20E2EE0F-699F-4CB1-B62B-38A965547372}" type="datetimeFigureOut">
               <a:rPr lang="pt-PT" smtClean="0"/>
-              <a:t>06/11/2017</a:t>
+              <a:t>02/02/2018</a:t>
             </a:fld>
             <a:endParaRPr lang="pt-PT"/>
           </a:p>
@@ -2397,7 +2401,7 @@
           <a:p>
             <a:fld id="{A4B850BD-FB52-4BDF-92B9-E9A29B33DEBB}" type="slidenum">
               <a:rPr lang="pt-PT" smtClean="0"/>
-              <a:t>‹#›</a:t>
+              <a:t>‹nº›</a:t>
             </a:fld>
             <a:endParaRPr lang="pt-PT"/>
           </a:p>
@@ -2464,7 +2468,7 @@
           <a:lstStyle/>
           <a:p>
             <a:r>
-              <a:rPr lang="en-US" smtClean="0"/>
+              <a:rPr lang="en-US"/>
               <a:t>Click to edit Master title style</a:t>
             </a:r>
             <a:endParaRPr lang="en-US" dirty="0"/>
@@ -2498,35 +2502,35 @@
           <a:p>
             <a:pPr lvl="0"/>
             <a:r>
-              <a:rPr lang="en-US" smtClean="0"/>
+              <a:rPr lang="en-US"/>
               <a:t>Edit Master text styles</a:t>
             </a:r>
           </a:p>
           <a:p>
             <a:pPr lvl="1"/>
             <a:r>
-              <a:rPr lang="en-US" smtClean="0"/>
+              <a:rPr lang="en-US"/>
               <a:t>Second level</a:t>
             </a:r>
           </a:p>
           <a:p>
             <a:pPr lvl="2"/>
             <a:r>
-              <a:rPr lang="en-US" smtClean="0"/>
+              <a:rPr lang="en-US"/>
               <a:t>Third level</a:t>
             </a:r>
           </a:p>
           <a:p>
             <a:pPr lvl="3"/>
             <a:r>
-              <a:rPr lang="en-US" smtClean="0"/>
+              <a:rPr lang="en-US"/>
               <a:t>Fourth level</a:t>
             </a:r>
           </a:p>
           <a:p>
             <a:pPr lvl="4"/>
             <a:r>
-              <a:rPr lang="en-US" smtClean="0"/>
+              <a:rPr lang="en-US"/>
               <a:t>Fifth level</a:t>
             </a:r>
             <a:endParaRPr lang="en-US" dirty="0"/>
@@ -2568,7 +2572,7 @@
           <a:p>
             <a:fld id="{20E2EE0F-699F-4CB1-B62B-38A965547372}" type="datetimeFigureOut">
               <a:rPr lang="pt-PT" smtClean="0"/>
-              <a:t>06/11/2017</a:t>
+              <a:t>02/02/2018</a:t>
             </a:fld>
             <a:endParaRPr lang="pt-PT"/>
           </a:p>
@@ -2646,7 +2650,7 @@
           <a:p>
             <a:fld id="{A4B850BD-FB52-4BDF-92B9-E9A29B33DEBB}" type="slidenum">
               <a:rPr lang="pt-PT" smtClean="0"/>
-              <a:t>‹#›</a:t>
+              <a:t>‹nº›</a:t>
             </a:fld>
             <a:endParaRPr lang="pt-PT"/>
           </a:p>
@@ -3075,8 +3079,8 @@
         </p:nvSpPr>
         <p:spPr>
           <a:xfrm>
-            <a:off x="2688592" y="1424587"/>
-            <a:ext cx="1417500" cy="2551500"/>
+            <a:off x="2399145" y="1424587"/>
+            <a:ext cx="1288636" cy="2551500"/>
           </a:xfrm>
           <a:prstGeom prst="roundRect">
             <a:avLst/>
@@ -3122,8 +3126,8 @@
         </p:nvSpPr>
         <p:spPr>
           <a:xfrm>
-            <a:off x="5193856" y="1424587"/>
-            <a:ext cx="1417500" cy="2551500"/>
+            <a:off x="4567532" y="1481346"/>
+            <a:ext cx="1288636" cy="2551500"/>
           </a:xfrm>
           <a:prstGeom prst="roundRect">
             <a:avLst/>
@@ -3154,11 +3158,11 @@
           <a:p>
             <a:pPr algn="ctr"/>
             <a:r>
-              <a:rPr lang="en-GB" sz="1418" smtClean="0"/>
+              <a:rPr lang="en-GB" sz="1418" dirty="0" err="1"/>
               <a:t>I_Homodyne</a:t>
             </a:r>
             <a:r>
-              <a:rPr lang="en-GB" sz="1418" dirty="0" smtClean="0"/>
+              <a:rPr lang="en-GB" sz="1418" dirty="0"/>
               <a:t> Receiver</a:t>
             </a:r>
             <a:endParaRPr lang="pt-PT" sz="1418" dirty="0"/>
@@ -3173,8 +3177,8 @@
         </p:nvSpPr>
         <p:spPr>
           <a:xfrm>
-            <a:off x="10204384" y="1424587"/>
-            <a:ext cx="1417500" cy="2551500"/>
+            <a:off x="10729701" y="1481346"/>
+            <a:ext cx="1288636" cy="2551500"/>
           </a:xfrm>
           <a:prstGeom prst="roundRect">
             <a:avLst/>
@@ -3220,8 +3224,8 @@
         </p:nvSpPr>
         <p:spPr>
           <a:xfrm>
-            <a:off x="12709648" y="1430937"/>
-            <a:ext cx="1417500" cy="2545150"/>
+            <a:off x="12862568" y="1488032"/>
+            <a:ext cx="1288636" cy="2545150"/>
           </a:xfrm>
           <a:prstGeom prst="roundRect">
             <a:avLst/>
@@ -3267,8 +3271,8 @@
         </p:nvSpPr>
         <p:spPr>
           <a:xfrm>
-            <a:off x="7699120" y="1424587"/>
-            <a:ext cx="1417500" cy="2551500"/>
+            <a:off x="8662441" y="1492394"/>
+            <a:ext cx="1288636" cy="2551500"/>
           </a:xfrm>
           <a:prstGeom prst="roundRect">
             <a:avLst/>
@@ -3299,7 +3303,7 @@
           <a:p>
             <a:pPr algn="ctr"/>
             <a:r>
-              <a:rPr lang="en-GB" sz="1418" dirty="0" smtClean="0"/>
+              <a:rPr lang="en-GB" sz="1418" dirty="0"/>
               <a:t>Bit Decider</a:t>
             </a:r>
             <a:endParaRPr lang="pt-PT" sz="1418" dirty="0"/>
@@ -3310,6 +3314,7 @@
         <p:nvCxnSpPr>
           <p:cNvPr id="14" name="Straight Arrow Connector 13"/>
           <p:cNvCxnSpPr>
+            <a:cxnSpLocks/>
             <a:stCxn id="4" idx="3"/>
           </p:cNvCxnSpPr>
           <p:nvPr/>
@@ -3317,7 +3322,7 @@
         <p:spPr>
           <a:xfrm>
             <a:off x="1600828" y="1991587"/>
-            <a:ext cx="1087200" cy="0"/>
+            <a:ext cx="808075" cy="0"/>
           </a:xfrm>
           <a:prstGeom prst="straightConnector1">
             <a:avLst/>
@@ -3345,6 +3350,7 @@
         <p:nvCxnSpPr>
           <p:cNvPr id="16" name="Straight Arrow Connector 15"/>
           <p:cNvCxnSpPr>
+            <a:cxnSpLocks/>
             <a:stCxn id="5" idx="3"/>
           </p:cNvCxnSpPr>
           <p:nvPr/>
@@ -3352,7 +3358,7 @@
         <p:spPr>
           <a:xfrm>
             <a:off x="1600828" y="3409087"/>
-            <a:ext cx="1087200" cy="0"/>
+            <a:ext cx="808075" cy="0"/>
           </a:xfrm>
           <a:prstGeom prst="straightConnector1">
             <a:avLst/>
@@ -3379,13 +3385,15 @@
       <p:cxnSp>
         <p:nvCxnSpPr>
           <p:cNvPr id="17" name="Straight Arrow Connector 16"/>
-          <p:cNvCxnSpPr/>
+          <p:cNvCxnSpPr>
+            <a:cxnSpLocks/>
+          </p:cNvCxnSpPr>
           <p:nvPr/>
         </p:nvCxnSpPr>
         <p:spPr>
           <a:xfrm>
-            <a:off x="4103874" y="1991587"/>
-            <a:ext cx="1087200" cy="0"/>
+            <a:off x="3687781" y="1991587"/>
+            <a:ext cx="884106" cy="0"/>
           </a:xfrm>
           <a:prstGeom prst="straightConnector1">
             <a:avLst/>
@@ -3412,13 +3420,15 @@
       <p:cxnSp>
         <p:nvCxnSpPr>
           <p:cNvPr id="18" name="Straight Arrow Connector 17"/>
-          <p:cNvCxnSpPr/>
+          <p:cNvCxnSpPr>
+            <a:cxnSpLocks/>
+          </p:cNvCxnSpPr>
           <p:nvPr/>
         </p:nvCxnSpPr>
         <p:spPr>
           <a:xfrm>
-            <a:off x="4103874" y="3409087"/>
-            <a:ext cx="1087200" cy="0"/>
+            <a:off x="3687781" y="3409087"/>
+            <a:ext cx="884106" cy="0"/>
           </a:xfrm>
           <a:prstGeom prst="straightConnector1">
             <a:avLst/>
@@ -3446,15 +3456,15 @@
         <p:nvCxnSpPr>
           <p:cNvPr id="20" name="Straight Arrow Connector 19"/>
           <p:cNvCxnSpPr>
+            <a:cxnSpLocks/>
             <a:stCxn id="7" idx="3"/>
-            <a:endCxn id="11" idx="1"/>
           </p:cNvCxnSpPr>
           <p:nvPr/>
         </p:nvCxnSpPr>
         <p:spPr>
           <a:xfrm>
-            <a:off x="6611356" y="2700337"/>
-            <a:ext cx="1087764" cy="0"/>
+            <a:off x="5856168" y="2757096"/>
+            <a:ext cx="731445" cy="0"/>
           </a:xfrm>
           <a:prstGeom prst="straightConnector1">
             <a:avLst/>
@@ -3482,15 +3492,16 @@
         <p:nvCxnSpPr>
           <p:cNvPr id="22" name="Straight Arrow Connector 21"/>
           <p:cNvCxnSpPr>
+            <a:cxnSpLocks/>
             <a:stCxn id="11" idx="3"/>
             <a:endCxn id="8" idx="1"/>
           </p:cNvCxnSpPr>
           <p:nvPr/>
         </p:nvCxnSpPr>
         <p:spPr>
-          <a:xfrm>
-            <a:off x="9116620" y="2700337"/>
-            <a:ext cx="1087764" cy="0"/>
+          <a:xfrm flipV="1">
+            <a:off x="9951077" y="2757096"/>
+            <a:ext cx="778624" cy="11048"/>
           </a:xfrm>
           <a:prstGeom prst="straightConnector1">
             <a:avLst/>
@@ -3518,6 +3529,7 @@
         <p:nvCxnSpPr>
           <p:cNvPr id="24" name="Straight Arrow Connector 23"/>
           <p:cNvCxnSpPr>
+            <a:cxnSpLocks/>
             <a:stCxn id="8" idx="3"/>
             <a:endCxn id="9" idx="1"/>
           </p:cNvCxnSpPr>
@@ -3525,8 +3537,8 @@
         </p:nvCxnSpPr>
         <p:spPr>
           <a:xfrm>
-            <a:off x="11621884" y="2700337"/>
-            <a:ext cx="1087764" cy="3175"/>
+            <a:off x="12018337" y="2757096"/>
+            <a:ext cx="844231" cy="3511"/>
           </a:xfrm>
           <a:prstGeom prst="straightConnector1">
             <a:avLst/>
@@ -3560,13 +3572,13 @@
           <p:nvPr/>
         </p:nvCxnSpPr>
         <p:spPr>
-          <a:xfrm rot="5400000" flipH="1" flipV="1">
-            <a:off x="5902606" y="-3585941"/>
-            <a:ext cx="12700" cy="10021056"/>
+          <a:xfrm rot="16200000" flipH="1">
+            <a:off x="6104668" y="-3788004"/>
+            <a:ext cx="56759" cy="10481941"/>
           </a:xfrm>
           <a:prstGeom prst="bentConnector3">
             <a:avLst>
-              <a:gd name="adj1" fmla="val 1800000"/>
+              <a:gd name="adj1" fmla="val -402756"/>
             </a:avLst>
           </a:prstGeom>
           <a:ln w="12700">
@@ -3617,7 +3629,7 @@
           <a:p>
             <a:pPr algn="ctr"/>
             <a:r>
-              <a:rPr lang="en-GB" sz="1600" dirty="0" smtClean="0"/>
+              <a:rPr lang="en-GB" sz="1600" dirty="0"/>
               <a:t>S_0</a:t>
             </a:r>
             <a:endParaRPr lang="pt-PT" sz="1600" dirty="0"/>
@@ -3632,7 +3644,7 @@
         </p:nvSpPr>
         <p:spPr>
           <a:xfrm>
-            <a:off x="1884449" y="1822310"/>
+            <a:off x="1717300" y="1822310"/>
             <a:ext cx="519958" cy="338554"/>
           </a:xfrm>
           <a:prstGeom prst="rect">
@@ -3653,7 +3665,7 @@
           <a:p>
             <a:pPr algn="ctr"/>
             <a:r>
-              <a:rPr lang="en-GB" sz="1600" dirty="0" smtClean="0"/>
+              <a:rPr lang="en-GB" sz="1600" dirty="0"/>
               <a:t>S_1</a:t>
             </a:r>
             <a:endParaRPr lang="pt-PT" sz="1600" dirty="0"/>
@@ -3668,7 +3680,7 @@
         </p:nvSpPr>
         <p:spPr>
           <a:xfrm>
-            <a:off x="1884449" y="3239810"/>
+            <a:off x="1717300" y="3239810"/>
             <a:ext cx="519958" cy="338554"/>
           </a:xfrm>
           <a:prstGeom prst="rect">
@@ -3689,7 +3701,7 @@
           <a:p>
             <a:pPr algn="ctr"/>
             <a:r>
-              <a:rPr lang="en-GB" sz="1600" dirty="0" smtClean="0"/>
+              <a:rPr lang="en-GB" sz="1600" dirty="0"/>
               <a:t>S_2</a:t>
             </a:r>
             <a:endParaRPr lang="pt-PT" sz="1600" dirty="0"/>
@@ -3704,7 +3716,7 @@
         </p:nvSpPr>
         <p:spPr>
           <a:xfrm>
-            <a:off x="4387495" y="1822310"/>
+            <a:off x="3836891" y="1822310"/>
             <a:ext cx="519958" cy="338554"/>
           </a:xfrm>
           <a:prstGeom prst="rect">
@@ -3725,7 +3737,7 @@
           <a:p>
             <a:pPr algn="ctr"/>
             <a:r>
-              <a:rPr lang="en-GB" sz="1600" dirty="0" smtClean="0"/>
+              <a:rPr lang="en-GB" sz="1600" dirty="0"/>
               <a:t>S_3</a:t>
             </a:r>
             <a:endParaRPr lang="pt-PT" sz="1600" dirty="0"/>
@@ -3740,7 +3752,7 @@
         </p:nvSpPr>
         <p:spPr>
           <a:xfrm>
-            <a:off x="4387495" y="3239810"/>
+            <a:off x="3836891" y="3239810"/>
             <a:ext cx="519958" cy="338554"/>
           </a:xfrm>
           <a:prstGeom prst="rect">
@@ -3761,7 +3773,7 @@
           <a:p>
             <a:pPr algn="ctr"/>
             <a:r>
-              <a:rPr lang="en-GB" sz="1600" dirty="0" smtClean="0"/>
+              <a:rPr lang="en-GB" sz="1600" dirty="0"/>
               <a:t>S_4</a:t>
             </a:r>
             <a:endParaRPr lang="pt-PT" sz="1600" dirty="0"/>
@@ -3776,8 +3788,8 @@
         </p:nvSpPr>
         <p:spPr>
           <a:xfrm>
-            <a:off x="6895259" y="2531060"/>
-            <a:ext cx="519958" cy="338554"/>
+            <a:off x="5958005" y="2602812"/>
+            <a:ext cx="501794" cy="338554"/>
           </a:xfrm>
           <a:prstGeom prst="rect">
             <a:avLst/>
@@ -3797,7 +3809,7 @@
           <a:p>
             <a:pPr algn="ctr"/>
             <a:r>
-              <a:rPr lang="en-GB" sz="1600" dirty="0" smtClean="0"/>
+              <a:rPr lang="en-GB" sz="1600" dirty="0"/>
               <a:t>S_5</a:t>
             </a:r>
             <a:endParaRPr lang="pt-PT" sz="1600" dirty="0"/>
@@ -3812,7 +3824,7 @@
         </p:nvSpPr>
         <p:spPr>
           <a:xfrm>
-            <a:off x="9400523" y="2531060"/>
+            <a:off x="10048218" y="2586242"/>
             <a:ext cx="519958" cy="338554"/>
           </a:xfrm>
           <a:prstGeom prst="rect">
@@ -3833,8 +3845,8 @@
           <a:p>
             <a:pPr algn="ctr"/>
             <a:r>
-              <a:rPr lang="en-GB" sz="1600" dirty="0" smtClean="0"/>
-              <a:t>S_6</a:t>
+              <a:rPr lang="en-GB" sz="1600" dirty="0"/>
+              <a:t>S_7</a:t>
             </a:r>
             <a:endParaRPr lang="pt-PT" sz="1600" dirty="0"/>
           </a:p>
@@ -3848,7 +3860,7 @@
         </p:nvSpPr>
         <p:spPr>
           <a:xfrm>
-            <a:off x="11905787" y="2531060"/>
+            <a:off x="12141759" y="2590053"/>
             <a:ext cx="519958" cy="338554"/>
           </a:xfrm>
           <a:prstGeom prst="rect">
@@ -3869,8 +3881,145 @@
           <a:p>
             <a:pPr algn="ctr"/>
             <a:r>
-              <a:rPr lang="en-GB" sz="1600" dirty="0" smtClean="0"/>
-              <a:t>S_7</a:t>
+              <a:rPr lang="en-GB" sz="1600" dirty="0"/>
+              <a:t>S_8</a:t>
+            </a:r>
+            <a:endParaRPr lang="pt-PT" sz="1600" dirty="0"/>
+          </a:p>
+        </p:txBody>
+      </p:sp>
+      <p:sp>
+        <p:nvSpPr>
+          <p:cNvPr id="54" name="Rounded Rectangle 7">
+            <a:extLst>
+              <a:ext uri="{FF2B5EF4-FFF2-40B4-BE49-F238E27FC236}">
+                <a16:creationId xmlns:a16="http://schemas.microsoft.com/office/drawing/2014/main" id="{9E9A6631-C2E3-4A00-AA51-66A53F106680}"/>
+              </a:ext>
+            </a:extLst>
+          </p:cNvPr>
+          <p:cNvSpPr/>
+          <p:nvPr/>
+        </p:nvSpPr>
+        <p:spPr>
+          <a:xfrm>
+            <a:off x="6608007" y="1481346"/>
+            <a:ext cx="1288636" cy="2551500"/>
+          </a:xfrm>
+          <a:prstGeom prst="roundRect">
+            <a:avLst/>
+          </a:prstGeom>
+        </p:spPr>
+        <p:style>
+          <a:lnRef idx="2">
+            <a:schemeClr val="dk1"/>
+          </a:lnRef>
+          <a:fillRef idx="1">
+            <a:schemeClr val="lt1"/>
+          </a:fillRef>
+          <a:effectRef idx="0">
+            <a:schemeClr val="dk1"/>
+          </a:effectRef>
+          <a:fontRef idx="minor">
+            <a:schemeClr val="dk1"/>
+          </a:fontRef>
+        </p:style>
+        <p:txBody>
+          <a:bodyPr rot="0" spcFirstLastPara="0" vertOverflow="overflow" horzOverflow="overflow" vert="horz" wrap="square" lIns="72009" tIns="36005" rIns="72009" bIns="36005" numCol="1" spcCol="0" rtlCol="0" fromWordArt="0" anchor="ctr" anchorCtr="0" forceAA="0" compatLnSpc="1">
+            <a:prstTxWarp prst="textNoShape">
+              <a:avLst/>
+            </a:prstTxWarp>
+            <a:noAutofit/>
+          </a:bodyPr>
+          <a:lstStyle/>
+          <a:p>
+            <a:pPr algn="ctr"/>
+            <a:r>
+              <a:rPr lang="pt-PT" sz="1418" dirty="0"/>
+              <a:t>Sampler</a:t>
+            </a:r>
+          </a:p>
+        </p:txBody>
+      </p:sp>
+      <p:cxnSp>
+        <p:nvCxnSpPr>
+          <p:cNvPr id="87" name="Straight Arrow Connector 21">
+            <a:extLst>
+              <a:ext uri="{FF2B5EF4-FFF2-40B4-BE49-F238E27FC236}">
+                <a16:creationId xmlns:a16="http://schemas.microsoft.com/office/drawing/2014/main" id="{CE06E995-2CE5-4638-92E6-021940825AB2}"/>
+              </a:ext>
+            </a:extLst>
+          </p:cNvPr>
+          <p:cNvCxnSpPr>
+            <a:cxnSpLocks/>
+            <a:stCxn id="54" idx="3"/>
+            <a:endCxn id="11" idx="1"/>
+          </p:cNvCxnSpPr>
+          <p:nvPr/>
+        </p:nvCxnSpPr>
+        <p:spPr>
+          <a:xfrm>
+            <a:off x="7896643" y="2757096"/>
+            <a:ext cx="765798" cy="11048"/>
+          </a:xfrm>
+          <a:prstGeom prst="straightConnector1">
+            <a:avLst/>
+          </a:prstGeom>
+          <a:ln w="12700">
+            <a:tailEnd type="triangle"/>
+          </a:ln>
+        </p:spPr>
+        <p:style>
+          <a:lnRef idx="1">
+            <a:schemeClr val="dk1"/>
+          </a:lnRef>
+          <a:fillRef idx="0">
+            <a:schemeClr val="dk1"/>
+          </a:fillRef>
+          <a:effectRef idx="0">
+            <a:schemeClr val="dk1"/>
+          </a:effectRef>
+          <a:fontRef idx="minor">
+            <a:schemeClr val="tx1"/>
+          </a:fontRef>
+        </p:style>
+      </p:cxnSp>
+      <p:sp>
+        <p:nvSpPr>
+          <p:cNvPr id="85" name="TextBox 46">
+            <a:extLst>
+              <a:ext uri="{FF2B5EF4-FFF2-40B4-BE49-F238E27FC236}">
+                <a16:creationId xmlns:a16="http://schemas.microsoft.com/office/drawing/2014/main" id="{7187AB92-7343-4CDF-B01D-ADCCE67EDA6A}"/>
+              </a:ext>
+            </a:extLst>
+          </p:cNvPr>
+          <p:cNvSpPr txBox="1"/>
+          <p:nvPr/>
+        </p:nvSpPr>
+        <p:spPr>
+          <a:xfrm>
+            <a:off x="7985151" y="2590053"/>
+            <a:ext cx="519958" cy="338554"/>
+          </a:xfrm>
+          <a:prstGeom prst="rect">
+            <a:avLst/>
+          </a:prstGeom>
+          <a:solidFill>
+            <a:schemeClr val="bg1"/>
+          </a:solidFill>
+          <a:ln>
+            <a:noFill/>
+          </a:ln>
+        </p:spPr>
+        <p:txBody>
+          <a:bodyPr wrap="square" rtlCol="0">
+            <a:spAutoFit/>
+          </a:bodyPr>
+          <a:lstStyle/>
+          <a:p>
+            <a:pPr algn="ctr"/>
+            <a:r>
+              <a:rPr lang="en-GB" sz="1600" dirty="0"/>
+              <a:t>S_6</a:t>
             </a:r>
             <a:endParaRPr lang="pt-PT" sz="1600" dirty="0"/>
           </a:p>
@@ -3886,13 +4035,6 @@
   <p:clrMapOvr>
     <a:masterClrMapping/>
   </p:clrMapOvr>
-  <p:timing>
-    <p:tnLst>
-      <p:par>
-        <p:cTn id="1" dur="indefinite" restart="never" nodeType="tmRoot"/>
-      </p:par>
-    </p:tnLst>
-  </p:timing>
 </p:sld>
 </file>
 

</xml_diff>

<commit_message>
Improved BPSK symbol constellation image
</commit_message>
<xml_diff>
--- a/doc/tex/sdf/bpsk_system/figures_raw/diagramNEW_BW.pptx
+++ b/doc/tex/sdf/bpsk_system/figures_raw/diagramNEW_BW.pptx
@@ -3271,7 +3271,7 @@
         </p:nvSpPr>
         <p:spPr>
           <a:xfrm>
-            <a:off x="8662441" y="1492394"/>
+            <a:off x="8659157" y="1481346"/>
             <a:ext cx="1288636" cy="2551500"/>
           </a:xfrm>
           <a:prstGeom prst="roundRect">
@@ -3499,9 +3499,9 @@
           <p:nvPr/>
         </p:nvCxnSpPr>
         <p:spPr>
-          <a:xfrm flipV="1">
-            <a:off x="9951077" y="2757096"/>
-            <a:ext cx="778624" cy="11048"/>
+          <a:xfrm>
+            <a:off x="9947793" y="2757096"/>
+            <a:ext cx="781908" cy="0"/>
           </a:xfrm>
           <a:prstGeom prst="straightConnector1">
             <a:avLst/>
@@ -3959,7 +3959,7 @@
         <p:spPr>
           <a:xfrm>
             <a:off x="7896643" y="2757096"/>
-            <a:ext cx="765798" cy="11048"/>
+            <a:ext cx="762514" cy="0"/>
           </a:xfrm>
           <a:prstGeom prst="straightConnector1">
             <a:avLst/>

</xml_diff>

<commit_message>
Updated BPSK and QPSK block scheme and documentation
</commit_message>
<xml_diff>
--- a/doc/tex/sdf/bpsk_system/figures_raw/diagramNEW_BW.pptx
+++ b/doc/tex/sdf/bpsk_system/figures_raw/diagramNEW_BW.pptx
@@ -247,7 +247,7 @@
           <a:p>
             <a:fld id="{20E2EE0F-699F-4CB1-B62B-38A965547372}" type="datetimeFigureOut">
               <a:rPr lang="pt-PT" smtClean="0"/>
-              <a:t>02/02/2018</a:t>
+              <a:t>08/07/2018</a:t>
             </a:fld>
             <a:endParaRPr lang="pt-PT"/>
           </a:p>
@@ -417,7 +417,7 @@
           <a:p>
             <a:fld id="{20E2EE0F-699F-4CB1-B62B-38A965547372}" type="datetimeFigureOut">
               <a:rPr lang="pt-PT" smtClean="0"/>
-              <a:t>02/02/2018</a:t>
+              <a:t>08/07/2018</a:t>
             </a:fld>
             <a:endParaRPr lang="pt-PT"/>
           </a:p>
@@ -597,7 +597,7 @@
           <a:p>
             <a:fld id="{20E2EE0F-699F-4CB1-B62B-38A965547372}" type="datetimeFigureOut">
               <a:rPr lang="pt-PT" smtClean="0"/>
-              <a:t>02/02/2018</a:t>
+              <a:t>08/07/2018</a:t>
             </a:fld>
             <a:endParaRPr lang="pt-PT"/>
           </a:p>
@@ -767,7 +767,7 @@
           <a:p>
             <a:fld id="{20E2EE0F-699F-4CB1-B62B-38A965547372}" type="datetimeFigureOut">
               <a:rPr lang="pt-PT" smtClean="0"/>
-              <a:t>02/02/2018</a:t>
+              <a:t>08/07/2018</a:t>
             </a:fld>
             <a:endParaRPr lang="pt-PT"/>
           </a:p>
@@ -1013,7 +1013,7 @@
           <a:p>
             <a:fld id="{20E2EE0F-699F-4CB1-B62B-38A965547372}" type="datetimeFigureOut">
               <a:rPr lang="pt-PT" smtClean="0"/>
-              <a:t>02/02/2018</a:t>
+              <a:t>08/07/2018</a:t>
             </a:fld>
             <a:endParaRPr lang="pt-PT"/>
           </a:p>
@@ -1245,7 +1245,7 @@
           <a:p>
             <a:fld id="{20E2EE0F-699F-4CB1-B62B-38A965547372}" type="datetimeFigureOut">
               <a:rPr lang="pt-PT" smtClean="0"/>
-              <a:t>02/02/2018</a:t>
+              <a:t>08/07/2018</a:t>
             </a:fld>
             <a:endParaRPr lang="pt-PT"/>
           </a:p>
@@ -1612,7 +1612,7 @@
           <a:p>
             <a:fld id="{20E2EE0F-699F-4CB1-B62B-38A965547372}" type="datetimeFigureOut">
               <a:rPr lang="pt-PT" smtClean="0"/>
-              <a:t>02/02/2018</a:t>
+              <a:t>08/07/2018</a:t>
             </a:fld>
             <a:endParaRPr lang="pt-PT"/>
           </a:p>
@@ -1730,7 +1730,7 @@
           <a:p>
             <a:fld id="{20E2EE0F-699F-4CB1-B62B-38A965547372}" type="datetimeFigureOut">
               <a:rPr lang="pt-PT" smtClean="0"/>
-              <a:t>02/02/2018</a:t>
+              <a:t>08/07/2018</a:t>
             </a:fld>
             <a:endParaRPr lang="pt-PT"/>
           </a:p>
@@ -1825,7 +1825,7 @@
           <a:p>
             <a:fld id="{20E2EE0F-699F-4CB1-B62B-38A965547372}" type="datetimeFigureOut">
               <a:rPr lang="pt-PT" smtClean="0"/>
-              <a:t>02/02/2018</a:t>
+              <a:t>08/07/2018</a:t>
             </a:fld>
             <a:endParaRPr lang="pt-PT"/>
           </a:p>
@@ -2102,7 +2102,7 @@
           <a:p>
             <a:fld id="{20E2EE0F-699F-4CB1-B62B-38A965547372}" type="datetimeFigureOut">
               <a:rPr lang="pt-PT" smtClean="0"/>
-              <a:t>02/02/2018</a:t>
+              <a:t>08/07/2018</a:t>
             </a:fld>
             <a:endParaRPr lang="pt-PT"/>
           </a:p>
@@ -2359,7 +2359,7 @@
           <a:p>
             <a:fld id="{20E2EE0F-699F-4CB1-B62B-38A965547372}" type="datetimeFigureOut">
               <a:rPr lang="pt-PT" smtClean="0"/>
-              <a:t>02/02/2018</a:t>
+              <a:t>08/07/2018</a:t>
             </a:fld>
             <a:endParaRPr lang="pt-PT"/>
           </a:p>
@@ -2572,7 +2572,7 @@
           <a:p>
             <a:fld id="{20E2EE0F-699F-4CB1-B62B-38A965547372}" type="datetimeFigureOut">
               <a:rPr lang="pt-PT" smtClean="0"/>
-              <a:t>02/02/2018</a:t>
+              <a:t>08/07/2018</a:t>
             </a:fld>
             <a:endParaRPr lang="pt-PT"/>
           </a:p>
@@ -3608,7 +3608,7 @@
         </p:nvSpPr>
         <p:spPr>
           <a:xfrm>
-            <a:off x="5965786" y="1018226"/>
+            <a:off x="5965786" y="831415"/>
             <a:ext cx="519958" cy="338554"/>
           </a:xfrm>
           <a:prstGeom prst="rect">
@@ -3630,7 +3630,7 @@
             <a:pPr algn="ctr"/>
             <a:r>
               <a:rPr lang="en-GB" sz="1600" dirty="0"/>
-              <a:t>S_0</a:t>
+              <a:t>S0</a:t>
             </a:r>
             <a:endParaRPr lang="pt-PT" sz="1600" dirty="0"/>
           </a:p>
@@ -3644,8 +3644,8 @@
         </p:nvSpPr>
         <p:spPr>
           <a:xfrm>
-            <a:off x="1717300" y="1822310"/>
-            <a:ext cx="519958" cy="338554"/>
+            <a:off x="1717300" y="1618568"/>
+            <a:ext cx="519958" cy="372409"/>
           </a:xfrm>
           <a:prstGeom prst="rect">
             <a:avLst/>
@@ -3666,7 +3666,7 @@
             <a:pPr algn="ctr"/>
             <a:r>
               <a:rPr lang="en-GB" sz="1600" dirty="0"/>
-              <a:t>S_1</a:t>
+              <a:t>S1</a:t>
             </a:r>
             <a:endParaRPr lang="pt-PT" sz="1600" dirty="0"/>
           </a:p>
@@ -3680,7 +3680,7 @@
         </p:nvSpPr>
         <p:spPr>
           <a:xfrm>
-            <a:off x="1717300" y="3239810"/>
+            <a:off x="1717300" y="3062830"/>
             <a:ext cx="519958" cy="338554"/>
           </a:xfrm>
           <a:prstGeom prst="rect">
@@ -3702,7 +3702,7 @@
             <a:pPr algn="ctr"/>
             <a:r>
               <a:rPr lang="en-GB" sz="1600" dirty="0"/>
-              <a:t>S_2</a:t>
+              <a:t>S2</a:t>
             </a:r>
             <a:endParaRPr lang="pt-PT" sz="1600" dirty="0"/>
           </a:p>
@@ -3716,7 +3716,7 @@
         </p:nvSpPr>
         <p:spPr>
           <a:xfrm>
-            <a:off x="3836891" y="1822310"/>
+            <a:off x="3836891" y="1645329"/>
             <a:ext cx="519958" cy="338554"/>
           </a:xfrm>
           <a:prstGeom prst="rect">
@@ -3738,7 +3738,7 @@
             <a:pPr algn="ctr"/>
             <a:r>
               <a:rPr lang="en-GB" sz="1600" dirty="0"/>
-              <a:t>S_3</a:t>
+              <a:t>S3</a:t>
             </a:r>
             <a:endParaRPr lang="pt-PT" sz="1600" dirty="0"/>
           </a:p>
@@ -3752,7 +3752,7 @@
         </p:nvSpPr>
         <p:spPr>
           <a:xfrm>
-            <a:off x="3836891" y="3239810"/>
+            <a:off x="3836891" y="3062829"/>
             <a:ext cx="519958" cy="338554"/>
           </a:xfrm>
           <a:prstGeom prst="rect">
@@ -3774,7 +3774,7 @@
             <a:pPr algn="ctr"/>
             <a:r>
               <a:rPr lang="en-GB" sz="1600" dirty="0"/>
-              <a:t>S_4</a:t>
+              <a:t>S4</a:t>
             </a:r>
             <a:endParaRPr lang="pt-PT" sz="1600" dirty="0"/>
           </a:p>
@@ -3788,7 +3788,7 @@
         </p:nvSpPr>
         <p:spPr>
           <a:xfrm>
-            <a:off x="5958005" y="2602812"/>
+            <a:off x="5958005" y="2406163"/>
             <a:ext cx="501794" cy="338554"/>
           </a:xfrm>
           <a:prstGeom prst="rect">
@@ -3810,7 +3810,7 @@
             <a:pPr algn="ctr"/>
             <a:r>
               <a:rPr lang="en-GB" sz="1600" dirty="0"/>
-              <a:t>S_5</a:t>
+              <a:t>S5</a:t>
             </a:r>
             <a:endParaRPr lang="pt-PT" sz="1600" dirty="0"/>
           </a:p>
@@ -3824,7 +3824,7 @@
         </p:nvSpPr>
         <p:spPr>
           <a:xfrm>
-            <a:off x="10048218" y="2586242"/>
+            <a:off x="10048218" y="2409257"/>
             <a:ext cx="519958" cy="338554"/>
           </a:xfrm>
           <a:prstGeom prst="rect">
@@ -3846,7 +3846,7 @@
             <a:pPr algn="ctr"/>
             <a:r>
               <a:rPr lang="en-GB" sz="1600" dirty="0"/>
-              <a:t>S_7</a:t>
+              <a:t>S7</a:t>
             </a:r>
             <a:endParaRPr lang="pt-PT" sz="1600" dirty="0"/>
           </a:p>
@@ -3860,7 +3860,7 @@
         </p:nvSpPr>
         <p:spPr>
           <a:xfrm>
-            <a:off x="12141759" y="2590053"/>
+            <a:off x="12141759" y="2413068"/>
             <a:ext cx="519958" cy="338554"/>
           </a:xfrm>
           <a:prstGeom prst="rect">
@@ -3882,7 +3882,7 @@
             <a:pPr algn="ctr"/>
             <a:r>
               <a:rPr lang="en-GB" sz="1600" dirty="0"/>
-              <a:t>S_8</a:t>
+              <a:t>S8</a:t>
             </a:r>
             <a:endParaRPr lang="pt-PT" sz="1600" dirty="0"/>
           </a:p>
@@ -3997,7 +3997,7 @@
         </p:nvSpPr>
         <p:spPr>
           <a:xfrm>
-            <a:off x="7985151" y="2590053"/>
+            <a:off x="7985151" y="2413068"/>
             <a:ext cx="519958" cy="338554"/>
           </a:xfrm>
           <a:prstGeom prst="rect">
@@ -4019,7 +4019,7 @@
             <a:pPr algn="ctr"/>
             <a:r>
               <a:rPr lang="en-GB" sz="1600" dirty="0"/>
-              <a:t>S_6</a:t>
+              <a:t>S6</a:t>
             </a:r>
             <a:endParaRPr lang="pt-PT" sz="1600" dirty="0"/>
           </a:p>

</xml_diff>